<commit_message>
Updated with latest version of code
</commit_message>
<xml_diff>
--- a/corkaltnet_func_concepts/func_prog_concepts_fsharp.pptx
+++ b/corkaltnet_func_concepts/func_prog_concepts_fsharp.pptx
@@ -19,6 +19,7 @@
     <p:sldId id="272" r:id="rId13"/>
     <p:sldId id="273" r:id="rId14"/>
     <p:sldId id="276" r:id="rId15"/>
+    <p:sldId id="278" r:id="rId16"/>
   </p:sldIdLst>
   <p:sldSz cx="12192000" cy="6858000"/>
   <p:notesSz cx="6858000" cy="9144000"/>
@@ -256,7 +257,7 @@
           <a:p>
             <a:fld id="{140D5AC1-5675-4AD2-9690-DD278B0913EB}" type="datetimeFigureOut">
               <a:rPr lang="en-IE" smtClean="0"/>
-              <a:t>21/02/2015</a:t>
+              <a:t>24/02/2015</a:t>
             </a:fld>
             <a:endParaRPr lang="en-IE"/>
           </a:p>
@@ -426,7 +427,7 @@
           <a:p>
             <a:fld id="{140D5AC1-5675-4AD2-9690-DD278B0913EB}" type="datetimeFigureOut">
               <a:rPr lang="en-IE" smtClean="0"/>
-              <a:t>21/02/2015</a:t>
+              <a:t>24/02/2015</a:t>
             </a:fld>
             <a:endParaRPr lang="en-IE"/>
           </a:p>
@@ -606,7 +607,7 @@
           <a:p>
             <a:fld id="{140D5AC1-5675-4AD2-9690-DD278B0913EB}" type="datetimeFigureOut">
               <a:rPr lang="en-IE" smtClean="0"/>
-              <a:t>21/02/2015</a:t>
+              <a:t>24/02/2015</a:t>
             </a:fld>
             <a:endParaRPr lang="en-IE"/>
           </a:p>
@@ -776,7 +777,7 @@
           <a:p>
             <a:fld id="{140D5AC1-5675-4AD2-9690-DD278B0913EB}" type="datetimeFigureOut">
               <a:rPr lang="en-IE" smtClean="0"/>
-              <a:t>21/02/2015</a:t>
+              <a:t>24/02/2015</a:t>
             </a:fld>
             <a:endParaRPr lang="en-IE"/>
           </a:p>
@@ -1022,7 +1023,7 @@
           <a:p>
             <a:fld id="{140D5AC1-5675-4AD2-9690-DD278B0913EB}" type="datetimeFigureOut">
               <a:rPr lang="en-IE" smtClean="0"/>
-              <a:t>21/02/2015</a:t>
+              <a:t>24/02/2015</a:t>
             </a:fld>
             <a:endParaRPr lang="en-IE"/>
           </a:p>
@@ -1254,7 +1255,7 @@
           <a:p>
             <a:fld id="{140D5AC1-5675-4AD2-9690-DD278B0913EB}" type="datetimeFigureOut">
               <a:rPr lang="en-IE" smtClean="0"/>
-              <a:t>21/02/2015</a:t>
+              <a:t>24/02/2015</a:t>
             </a:fld>
             <a:endParaRPr lang="en-IE"/>
           </a:p>
@@ -1621,7 +1622,7 @@
           <a:p>
             <a:fld id="{140D5AC1-5675-4AD2-9690-DD278B0913EB}" type="datetimeFigureOut">
               <a:rPr lang="en-IE" smtClean="0"/>
-              <a:t>21/02/2015</a:t>
+              <a:t>24/02/2015</a:t>
             </a:fld>
             <a:endParaRPr lang="en-IE"/>
           </a:p>
@@ -1739,7 +1740,7 @@
           <a:p>
             <a:fld id="{140D5AC1-5675-4AD2-9690-DD278B0913EB}" type="datetimeFigureOut">
               <a:rPr lang="en-IE" smtClean="0"/>
-              <a:t>21/02/2015</a:t>
+              <a:t>24/02/2015</a:t>
             </a:fld>
             <a:endParaRPr lang="en-IE"/>
           </a:p>
@@ -1834,7 +1835,7 @@
           <a:p>
             <a:fld id="{140D5AC1-5675-4AD2-9690-DD278B0913EB}" type="datetimeFigureOut">
               <a:rPr lang="en-IE" smtClean="0"/>
-              <a:t>21/02/2015</a:t>
+              <a:t>24/02/2015</a:t>
             </a:fld>
             <a:endParaRPr lang="en-IE"/>
           </a:p>
@@ -2111,7 +2112,7 @@
           <a:p>
             <a:fld id="{140D5AC1-5675-4AD2-9690-DD278B0913EB}" type="datetimeFigureOut">
               <a:rPr lang="en-IE" smtClean="0"/>
-              <a:t>21/02/2015</a:t>
+              <a:t>24/02/2015</a:t>
             </a:fld>
             <a:endParaRPr lang="en-IE"/>
           </a:p>
@@ -2364,7 +2365,7 @@
           <a:p>
             <a:fld id="{140D5AC1-5675-4AD2-9690-DD278B0913EB}" type="datetimeFigureOut">
               <a:rPr lang="en-IE" smtClean="0"/>
-              <a:t>21/02/2015</a:t>
+              <a:t>24/02/2015</a:t>
             </a:fld>
             <a:endParaRPr lang="en-IE"/>
           </a:p>
@@ -2577,7 +2578,7 @@
           <a:p>
             <a:fld id="{140D5AC1-5675-4AD2-9690-DD278B0913EB}" type="datetimeFigureOut">
               <a:rPr lang="en-IE" smtClean="0"/>
-              <a:t>21/02/2015</a:t>
+              <a:t>24/02/2015</a:t>
             </a:fld>
             <a:endParaRPr lang="en-IE"/>
           </a:p>
@@ -3988,6 +3989,223 @@
 </p:sld>
 </file>
 
+<file path=ppt/slides/slide15.xml><?xml version="1.0" encoding="utf-8"?>
+<p:sld xmlns:a="http://schemas.openxmlformats.org/drawingml/2006/main" xmlns:r="http://schemas.openxmlformats.org/officeDocument/2006/relationships" xmlns:p="http://schemas.openxmlformats.org/presentationml/2006/main">
+  <p:cSld>
+    <p:spTree>
+      <p:nvGrpSpPr>
+        <p:cNvPr id="1" name=""/>
+        <p:cNvGrpSpPr/>
+        <p:nvPr/>
+      </p:nvGrpSpPr>
+      <p:grpSpPr>
+        <a:xfrm>
+          <a:off x="0" y="0"/>
+          <a:ext cx="0" cy="0"/>
+          <a:chOff x="0" y="0"/>
+          <a:chExt cx="0" cy="0"/>
+        </a:xfrm>
+      </p:grpSpPr>
+      <p:sp>
+        <p:nvSpPr>
+          <p:cNvPr id="2" name="Title 1"/>
+          <p:cNvSpPr>
+            <a:spLocks noGrp="1"/>
+          </p:cNvSpPr>
+          <p:nvPr>
+            <p:ph type="title"/>
+          </p:nvPr>
+        </p:nvSpPr>
+        <p:spPr/>
+        <p:txBody>
+          <a:bodyPr/>
+          <a:lstStyle/>
+          <a:p>
+            <a:r>
+              <a:rPr lang="en-IE" dirty="0" smtClean="0"/>
+              <a:t>Where to learn more</a:t>
+            </a:r>
+            <a:endParaRPr lang="en-IE" dirty="0"/>
+          </a:p>
+        </p:txBody>
+      </p:sp>
+      <p:sp>
+        <p:nvSpPr>
+          <p:cNvPr id="3" name="Content Placeholder 2"/>
+          <p:cNvSpPr>
+            <a:spLocks noGrp="1"/>
+          </p:cNvSpPr>
+          <p:nvPr>
+            <p:ph idx="1"/>
+          </p:nvPr>
+        </p:nvSpPr>
+        <p:spPr/>
+        <p:txBody>
+          <a:bodyPr>
+            <a:normAutofit fontScale="92500" lnSpcReduction="10000"/>
+          </a:bodyPr>
+          <a:lstStyle/>
+          <a:p>
+            <a:r>
+              <a:rPr lang="en-IE" dirty="0">
+                <a:hlinkClick r:id="rId2"/>
+              </a:rPr>
+              <a:t>http://</a:t>
+            </a:r>
+            <a:r>
+              <a:rPr lang="en-IE" dirty="0" smtClean="0">
+                <a:hlinkClick r:id="rId2"/>
+              </a:rPr>
+              <a:t>fsharp.org/about/learning.html</a:t>
+            </a:r>
+            <a:endParaRPr lang="en-IE" dirty="0" smtClean="0"/>
+          </a:p>
+          <a:p>
+            <a:r>
+              <a:rPr lang="en-IE" dirty="0" smtClean="0">
+                <a:hlinkClick r:id="rId3"/>
+              </a:rPr>
+              <a:t>http</a:t>
+            </a:r>
+            <a:r>
+              <a:rPr lang="en-IE" dirty="0">
+                <a:hlinkClick r:id="rId3"/>
+              </a:rPr>
+              <a:t>://fsharpforfunandprofit.com</a:t>
+            </a:r>
+            <a:r>
+              <a:rPr lang="en-IE" dirty="0" smtClean="0">
+                <a:hlinkClick r:id="rId3"/>
+              </a:rPr>
+              <a:t>/</a:t>
+            </a:r>
+            <a:endParaRPr lang="en-IE" dirty="0" smtClean="0"/>
+          </a:p>
+          <a:p>
+            <a:r>
+              <a:rPr lang="en-IE" dirty="0">
+                <a:hlinkClick r:id="rId4"/>
+              </a:rPr>
+              <a:t>https://</a:t>
+            </a:r>
+            <a:r>
+              <a:rPr lang="en-IE" dirty="0" smtClean="0">
+                <a:hlinkClick r:id="rId4"/>
+              </a:rPr>
+              <a:t>msdn.microsoft.com/en-us/library/dd233154.aspx</a:t>
+            </a:r>
+            <a:endParaRPr lang="en-IE" dirty="0" smtClean="0"/>
+          </a:p>
+          <a:p>
+            <a:r>
+              <a:rPr lang="en-IE" dirty="0" smtClean="0"/>
+              <a:t>Twitter hashtag #</a:t>
+            </a:r>
+            <a:r>
+              <a:rPr lang="en-IE" dirty="0" err="1" smtClean="0"/>
+              <a:t>fsharp</a:t>
+            </a:r>
+            <a:endParaRPr lang="en-IE" dirty="0" smtClean="0"/>
+          </a:p>
+          <a:p>
+            <a:r>
+              <a:rPr lang="en-IE" dirty="0" err="1" smtClean="0"/>
+              <a:t>Stackoverflow</a:t>
+            </a:r>
+            <a:endParaRPr lang="en-IE" dirty="0" smtClean="0"/>
+          </a:p>
+          <a:p>
+            <a:r>
+              <a:rPr lang="en-IE" dirty="0" smtClean="0"/>
+              <a:t>Books</a:t>
+            </a:r>
+          </a:p>
+          <a:p>
+            <a:pPr lvl="1"/>
+            <a:r>
+              <a:rPr lang="en-IE" dirty="0" smtClean="0"/>
+              <a:t>Expert f# 3.0 (Don </a:t>
+            </a:r>
+            <a:r>
+              <a:rPr lang="en-IE" dirty="0" err="1" smtClean="0"/>
+              <a:t>Syme</a:t>
+            </a:r>
+            <a:r>
+              <a:rPr lang="en-IE" dirty="0" smtClean="0"/>
+              <a:t>)</a:t>
+            </a:r>
+          </a:p>
+          <a:p>
+            <a:pPr lvl="1"/>
+            <a:r>
+              <a:rPr lang="en-IE" dirty="0" smtClean="0"/>
+              <a:t>F# deep dives (Tomas </a:t>
+            </a:r>
+            <a:r>
+              <a:rPr lang="en-IE" dirty="0" err="1" smtClean="0"/>
+              <a:t>Petricek</a:t>
+            </a:r>
+            <a:r>
+              <a:rPr lang="en-IE" dirty="0" smtClean="0"/>
+              <a:t> and Phillip </a:t>
+            </a:r>
+            <a:r>
+              <a:rPr lang="en-IE" dirty="0" err="1" smtClean="0"/>
+              <a:t>Trelford</a:t>
+            </a:r>
+            <a:r>
+              <a:rPr lang="en-IE" dirty="0" smtClean="0"/>
+              <a:t>)</a:t>
+            </a:r>
+          </a:p>
+          <a:p>
+            <a:r>
+              <a:rPr lang="en-IE" dirty="0" smtClean="0"/>
+              <a:t>Functional </a:t>
+            </a:r>
+            <a:r>
+              <a:rPr lang="en-IE" dirty="0"/>
+              <a:t>user groups (</a:t>
+            </a:r>
+            <a:r>
+              <a:rPr lang="en-IE" dirty="0">
+                <a:hlinkClick r:id="rId5"/>
+              </a:rPr>
+              <a:t>http://www.meetup.com/FunctionalKats</a:t>
+            </a:r>
+            <a:r>
+              <a:rPr lang="en-IE" dirty="0" smtClean="0">
+                <a:hlinkClick r:id="rId5"/>
+              </a:rPr>
+              <a:t>/</a:t>
+            </a:r>
+            <a:r>
+              <a:rPr lang="en-IE" dirty="0" smtClean="0"/>
+              <a:t>)</a:t>
+            </a:r>
+          </a:p>
+          <a:p>
+            <a:r>
+              <a:rPr lang="en-IE" dirty="0" smtClean="0"/>
+              <a:t>Functional programming workshops and conferences</a:t>
+            </a:r>
+            <a:endParaRPr lang="en-IE" dirty="0"/>
+          </a:p>
+        </p:txBody>
+      </p:sp>
+    </p:spTree>
+    <p:extLst>
+      <p:ext uri="{BB962C8B-B14F-4D97-AF65-F5344CB8AC3E}">
+        <p14:creationId xmlns:p14="http://schemas.microsoft.com/office/powerpoint/2010/main" val="1232226811"/>
+      </p:ext>
+    </p:extLst>
+  </p:cSld>
+  <p:clrMapOvr>
+    <a:masterClrMapping/>
+  </p:clrMapOvr>
+</p:sld>
+</file>
+
 <file path=ppt/slides/slide2.xml><?xml version="1.0" encoding="utf-8"?>
 <p:sld xmlns:a="http://schemas.openxmlformats.org/drawingml/2006/main" xmlns:r="http://schemas.openxmlformats.org/officeDocument/2006/relationships" xmlns:p="http://schemas.openxmlformats.org/presentationml/2006/main">
   <p:cSld>
@@ -4282,12 +4500,16 @@
               <a:t>Flexible, is more </a:t>
             </a:r>
             <a:r>
-              <a:rPr lang="en-IE" dirty="0" err="1" smtClean="0"/>
-              <a:t>oo</a:t>
-            </a:r>
-            <a:r>
-              <a:rPr lang="en-IE" dirty="0" smtClean="0"/>
-              <a:t> than other functional languages</a:t>
+              <a:rPr lang="en-IE" dirty="0" smtClean="0"/>
+              <a:t>OO</a:t>
+            </a:r>
+            <a:r>
+              <a:rPr lang="en-IE" dirty="0" smtClean="0"/>
+              <a:t> </a:t>
+            </a:r>
+            <a:r>
+              <a:rPr lang="en-IE" dirty="0" smtClean="0"/>
+              <a:t>than other functional languages</a:t>
             </a:r>
           </a:p>
           <a:p>
@@ -4781,7 +5003,11 @@
           <a:p>
             <a:r>
               <a:rPr lang="en-IE" dirty="0" smtClean="0"/>
-              <a:t>One of the main proposals for C# 6.0</a:t>
+              <a:t>One of the main proposals for C# </a:t>
+            </a:r>
+            <a:r>
+              <a:rPr lang="en-IE" dirty="0" smtClean="0"/>
+              <a:t>7</a:t>
             </a:r>
             <a:endParaRPr lang="en-IE" dirty="0"/>
           </a:p>

</xml_diff>